<commit_message>
pptx με λινκ στο youtube video
</commit_message>
<xml_diff>
--- a/Docs/React Native Template Builder.pptx
+++ b/Docs/React Native Template Builder.pptx
@@ -5788,8 +5788,8 @@
         </p:nvSpPr>
         <p:spPr>
           <a:xfrm>
-            <a:off x="541610" y="2614428"/>
-            <a:ext cx="11345590" cy="2806658"/>
+            <a:off x="541610" y="2614427"/>
+            <a:ext cx="11345590" cy="3747183"/>
           </a:xfrm>
         </p:spPr>
         <p:txBody>
@@ -5941,8 +5941,85 @@
                 </a:solidFill>
                 <a:latin typeface="Segoe UI Light" panose="020B0502040204020203" pitchFamily="34" charset="0"/>
                 <a:cs typeface="Segoe UI Light" panose="020B0502040204020203" pitchFamily="34" charset="0"/>
-              </a:rPr>
-              <a:t>https://github.com/Vuxxs/react-native-template-builder</a:t>
+                <a:hlinkClick r:id="rId4"/>
+              </a:rPr>
+              <a:t>https://</a:t>
+            </a:r>
+            <a:r>
+              <a:rPr lang="en-US" sz="2200" b="1" dirty="0" smtClean="0">
+                <a:solidFill>
+                  <a:schemeClr val="accent1">
+                    <a:lumMod val="50000"/>
+                  </a:schemeClr>
+                </a:solidFill>
+                <a:latin typeface="Segoe UI Light" panose="020B0502040204020203" pitchFamily="34" charset="0"/>
+                <a:cs typeface="Segoe UI Light" panose="020B0502040204020203" pitchFamily="34" charset="0"/>
+                <a:hlinkClick r:id="rId4"/>
+              </a:rPr>
+              <a:t>github.com/Vuxxs/react-native-template-builder</a:t>
+            </a:r>
+            <a:endParaRPr lang="en-US" sz="2200" b="1" dirty="0" smtClean="0">
+              <a:solidFill>
+                <a:schemeClr val="accent1">
+                  <a:lumMod val="50000"/>
+                </a:schemeClr>
+              </a:solidFill>
+              <a:latin typeface="Segoe UI Light" panose="020B0502040204020203" pitchFamily="34" charset="0"/>
+              <a:cs typeface="Segoe UI Light" panose="020B0502040204020203" pitchFamily="34" charset="0"/>
+            </a:endParaRPr>
+          </a:p>
+          <a:p>
+            <a:pPr>
+              <a:lnSpc>
+                <a:spcPts val="3600"/>
+              </a:lnSpc>
+              <a:spcAft>
+                <a:spcPts val="0"/>
+              </a:spcAft>
+            </a:pPr>
+            <a:r>
+              <a:rPr lang="en-US" sz="2000" u="sng" dirty="0">
+                <a:latin typeface="Segoe UI Light" panose="020B0502040204020203" pitchFamily="34" charset="0"/>
+                <a:cs typeface="Segoe UI Light" panose="020B0502040204020203" pitchFamily="34" charset="0"/>
+              </a:rPr>
+              <a:t>Video </a:t>
+            </a:r>
+            <a:r>
+              <a:rPr lang="en-US" sz="2000" u="sng" dirty="0" smtClean="0">
+                <a:latin typeface="Segoe UI Light" panose="020B0502040204020203" pitchFamily="34" charset="0"/>
+                <a:cs typeface="Segoe UI Light" panose="020B0502040204020203" pitchFamily="34" charset="0"/>
+              </a:rPr>
+              <a:t>– </a:t>
+            </a:r>
+            <a:r>
+              <a:rPr lang="el-GR" sz="2000" u="sng" dirty="0" smtClean="0">
+                <a:latin typeface="Segoe UI Light" panose="020B0502040204020203" pitchFamily="34" charset="0"/>
+                <a:cs typeface="Segoe UI Light" panose="020B0502040204020203" pitchFamily="34" charset="0"/>
+              </a:rPr>
+              <a:t>παρουσίαση</a:t>
+            </a:r>
+          </a:p>
+          <a:p>
+            <a:pPr>
+              <a:lnSpc>
+                <a:spcPts val="3600"/>
+              </a:lnSpc>
+              <a:spcAft>
+                <a:spcPts val="0"/>
+              </a:spcAft>
+            </a:pPr>
+            <a:r>
+              <a:rPr lang="en-US" sz="2200" b="1" dirty="0">
+                <a:solidFill>
+                  <a:schemeClr val="accent1">
+                    <a:lumMod val="50000"/>
+                  </a:schemeClr>
+                </a:solidFill>
+                <a:latin typeface="Segoe UI Light" panose="020B0502040204020203" pitchFamily="34" charset="0"/>
+                <a:cs typeface="Segoe UI Light" panose="020B0502040204020203" pitchFamily="34" charset="0"/>
+                <a:hlinkClick r:id="rId5"/>
+              </a:rPr>
+              <a:t>https://www.youtube.com/watch?v=Ejwwq1q309E</a:t>
             </a:r>
             <a:endParaRPr lang="el-GR" sz="2200" b="1" dirty="0">
               <a:solidFill>
@@ -5978,6 +6055,13 @@
       </p:transition>
     </mc:Fallback>
   </mc:AlternateContent>
+  <p:timing>
+    <p:tnLst>
+      <p:par>
+        <p:cTn id="1" dur="indefinite" restart="never" nodeType="tmRoot"/>
+      </p:par>
+    </p:tnLst>
+  </p:timing>
 </p:sld>
 </file>
 
@@ -6361,14 +6445,7 @@
                 <a:latin typeface="Segoe UI" panose="020B0502040204020203" pitchFamily="34" charset="0"/>
                 <a:cs typeface="Segoe UI" panose="020B0502040204020203" pitchFamily="34" charset="0"/>
               </a:rPr>
-              <a:t>React </a:t>
-            </a:r>
-            <a:r>
-              <a:rPr lang="en-US" sz="2400" dirty="0" smtClean="0">
-                <a:latin typeface="Segoe UI" panose="020B0502040204020203" pitchFamily="34" charset="0"/>
-                <a:cs typeface="Segoe UI" panose="020B0502040204020203" pitchFamily="34" charset="0"/>
-              </a:rPr>
-              <a:t>Native</a:t>
+              <a:t>React Native</a:t>
             </a:r>
             <a:endParaRPr lang="el-GR" sz="2400" dirty="0" smtClean="0">
               <a:latin typeface="Segoe UI" panose="020B0502040204020203" pitchFamily="34" charset="0"/>
@@ -8681,16 +8758,6 @@
               </a:rPr>
               <a:t>.</a:t>
             </a:r>
-            <a:endParaRPr lang="el-GR" sz="2400" dirty="0" smtClean="0">
-              <a:solidFill>
-                <a:prstClr val="black">
-                  <a:lumMod val="75000"/>
-                  <a:lumOff val="25000"/>
-                </a:prstClr>
-              </a:solidFill>
-              <a:latin typeface="Segoe UI" panose="020B0502040204020203" pitchFamily="34" charset="0"/>
-              <a:cs typeface="Segoe UI" panose="020B0502040204020203" pitchFamily="34" charset="0"/>
-            </a:endParaRPr>
           </a:p>
         </p:txBody>
       </p:sp>
@@ -8885,20 +8952,7 @@
                 <a:latin typeface="Segoe UI" panose="020B0502040204020203" pitchFamily="34" charset="0"/>
                 <a:cs typeface="Segoe UI" panose="020B0502040204020203" pitchFamily="34" charset="0"/>
               </a:rPr>
-              <a:t>Στο </a:t>
-            </a:r>
-            <a:r>
-              <a:rPr lang="el-GR" sz="2400" dirty="0" smtClean="0">
-                <a:solidFill>
-                  <a:prstClr val="black">
-                    <a:lumMod val="75000"/>
-                    <a:lumOff val="25000"/>
-                  </a:prstClr>
-                </a:solidFill>
-                <a:latin typeface="Segoe UI" panose="020B0502040204020203" pitchFamily="34" charset="0"/>
-                <a:cs typeface="Segoe UI" panose="020B0502040204020203" pitchFamily="34" charset="0"/>
-              </a:rPr>
-              <a:t>φάκελο </a:t>
+              <a:t>Στο φάκελο </a:t>
             </a:r>
             <a:r>
               <a:rPr lang="en-US" sz="2400" dirty="0" smtClean="0">
@@ -10160,6 +10214,15 @@
 </file>
 
 <file path=customXml/item1.xml><?xml version="1.0" encoding="utf-8"?>
+<?mso-contentType ?>
+<FormTemplates xmlns="http://schemas.microsoft.com/sharepoint/v3/contenttype/forms">
+  <Display>DocumentLibraryForm</Display>
+  <Edit>DocumentLibraryForm</Edit>
+  <New>DocumentLibraryForm</New>
+</FormTemplates>
+</file>
+
+<file path=customXml/item2.xml><?xml version="1.0" encoding="utf-8"?>
 <ct:contentTypeSchema xmlns:ct="http://schemas.microsoft.com/office/2006/metadata/contentType" xmlns:ma="http://schemas.microsoft.com/office/2006/metadata/properties/metaAttributes" ct:_="" ma:_="" ma:contentTypeName="Document" ma:contentTypeID="0x01010079F111ED35F8CC479449609E8A0923A6" ma:contentTypeVersion="12" ma:contentTypeDescription="Create a new document." ma:contentTypeScope="" ma:versionID="a8a52e8c320b9a064ae3583ae3861c92">
   <xsd:schema xmlns:xsd="http://www.w3.org/2001/XMLSchema" xmlns:xs="http://www.w3.org/2001/XMLSchema" xmlns:p="http://schemas.microsoft.com/office/2006/metadata/properties" xmlns:ns2="71af3243-3dd4-4a8d-8c0d-dd76da1f02a5" xmlns:ns3="16c05727-aa75-4e4a-9b5f-8a80a1165891" targetNamespace="http://schemas.microsoft.com/office/2006/metadata/properties" ma:root="true" ma:fieldsID="88020cb39231a0945110f9cd888b521a" ns2:_="" ns3:_="">
     <xsd:import namespace="71af3243-3dd4-4a8d-8c0d-dd76da1f02a5"/>
@@ -10380,15 +10443,6 @@
 </ct:contentTypeSchema>
 </file>
 
-<file path=customXml/item2.xml><?xml version="1.0" encoding="utf-8"?>
-<?mso-contentType ?>
-<FormTemplates xmlns="http://schemas.microsoft.com/sharepoint/v3/contenttype/forms">
-  <Display>DocumentLibraryForm</Display>
-  <Edit>DocumentLibraryForm</Edit>
-  <New>DocumentLibraryForm</New>
-</FormTemplates>
-</file>
-
 <file path=customXml/item3.xml><?xml version="1.0" encoding="utf-8"?>
 <p:properties xmlns:p="http://schemas.microsoft.com/office/2006/metadata/properties" xmlns:xsi="http://www.w3.org/2001/XMLSchema-instance" xmlns:pc="http://schemas.microsoft.com/office/infopath/2007/PartnerControls">
   <documentManagement>
@@ -10399,6 +10453,14 @@
 </file>
 
 <file path=customXml/itemProps1.xml><?xml version="1.0" encoding="utf-8"?>
+<ds:datastoreItem xmlns:ds="http://schemas.openxmlformats.org/officeDocument/2006/customXml" ds:itemID="{7EE8C63A-4744-4DE4-BB49-0FF0B5375C60}">
+  <ds:schemaRefs>
+    <ds:schemaRef ds:uri="http://schemas.microsoft.com/sharepoint/v3/contenttype/forms"/>
+  </ds:schemaRefs>
+</ds:datastoreItem>
+</file>
+
+<file path=customXml/itemProps2.xml><?xml version="1.0" encoding="utf-8"?>
 <ds:datastoreItem xmlns:ds="http://schemas.openxmlformats.org/officeDocument/2006/customXml" ds:itemID="{FD7FC771-7DFE-49DA-B577-71181BFBCB2E}">
   <ds:schemaRefs>
     <ds:schemaRef ds:uri="http://schemas.microsoft.com/office/2006/metadata/contentType"/>
@@ -10417,14 +10479,6 @@
 </ds:datastoreItem>
 </file>
 
-<file path=customXml/itemProps2.xml><?xml version="1.0" encoding="utf-8"?>
-<ds:datastoreItem xmlns:ds="http://schemas.openxmlformats.org/officeDocument/2006/customXml" ds:itemID="{7EE8C63A-4744-4DE4-BB49-0FF0B5375C60}">
-  <ds:schemaRefs>
-    <ds:schemaRef ds:uri="http://schemas.microsoft.com/sharepoint/v3/contenttype/forms"/>
-  </ds:schemaRefs>
-</ds:datastoreItem>
-</file>
-
 <file path=customXml/itemProps3.xml><?xml version="1.0" encoding="utf-8"?>
 <ds:datastoreItem xmlns:ds="http://schemas.openxmlformats.org/officeDocument/2006/customXml" ds:itemID="{950072C5-DDE0-4258-BA7A-4D4B80DFA632}">
   <ds:schemaRefs>

</xml_diff>